<commit_message>
adding fresh copies of hodons assignments and sides folder...
</commit_message>
<xml_diff>
--- a/slides/09_Cpp-Select-Topics-Pt-02.pptx
+++ b/slides/09_Cpp-Select-Topics-Pt-02.pptx
@@ -5,10 +5,10 @@
     <p:sldMasterId id="2147483828" r:id="rId1"/>
   </p:sldMasterIdLst>
   <p:notesMasterIdLst>
-    <p:notesMasterId r:id="rId33"/>
+    <p:notesMasterId r:id="rId34"/>
   </p:notesMasterIdLst>
   <p:handoutMasterIdLst>
-    <p:handoutMasterId r:id="rId34"/>
+    <p:handoutMasterId r:id="rId35"/>
   </p:handoutMasterIdLst>
   <p:sldIdLst>
     <p:sldId id="347" r:id="rId2"/>
@@ -32,16 +32,17 @@
     <p:sldId id="443" r:id="rId20"/>
     <p:sldId id="444" r:id="rId21"/>
     <p:sldId id="445" r:id="rId22"/>
-    <p:sldId id="435" r:id="rId23"/>
-    <p:sldId id="446" r:id="rId24"/>
-    <p:sldId id="447" r:id="rId25"/>
-    <p:sldId id="449" r:id="rId26"/>
-    <p:sldId id="450" r:id="rId27"/>
-    <p:sldId id="451" r:id="rId28"/>
-    <p:sldId id="452" r:id="rId29"/>
-    <p:sldId id="453" r:id="rId30"/>
-    <p:sldId id="454" r:id="rId31"/>
-    <p:sldId id="393" r:id="rId32"/>
+    <p:sldId id="449" r:id="rId23"/>
+    <p:sldId id="450" r:id="rId24"/>
+    <p:sldId id="451" r:id="rId25"/>
+    <p:sldId id="452" r:id="rId26"/>
+    <p:sldId id="453" r:id="rId27"/>
+    <p:sldId id="454" r:id="rId28"/>
+    <p:sldId id="455" r:id="rId29"/>
+    <p:sldId id="393" r:id="rId30"/>
+    <p:sldId id="435" r:id="rId31"/>
+    <p:sldId id="446" r:id="rId32"/>
+    <p:sldId id="447" r:id="rId33"/>
   </p:sldIdLst>
   <p:sldSz cx="9144000" cy="6858000" type="screen4x3"/>
   <p:notesSz cx="6858000" cy="9144000"/>
@@ -3135,8 +3136,12 @@
           <a:lstStyle/>
           <a:p>
             <a:r>
+              <a:rPr lang="en-US" dirty="0" err="1" smtClean="0"/>
+              <a:t>rvalue</a:t>
+            </a:r>
+            <a:r>
               <a:rPr lang="en-US" dirty="0" smtClean="0"/>
-              <a:t>rvalue, so Confusing, Why?</a:t>
+              <a:t> References Enable What?</a:t>
             </a:r>
             <a:endParaRPr lang="en-US" dirty="0"/>
           </a:p>
@@ -3154,8 +3159,8 @@
         </p:nvSpPr>
         <p:spPr>
           <a:xfrm>
-            <a:off x="457200" y="4709978"/>
-            <a:ext cx="8229600" cy="1538422"/>
+            <a:off x="457200" y="4981038"/>
+            <a:ext cx="8229600" cy="1267362"/>
           </a:xfrm>
         </p:spPr>
         <p:txBody>
@@ -3187,9 +3192,9 @@
         <p:grpSpPr>
           <a:xfrm>
             <a:off x="1328057" y="1295400"/>
-            <a:ext cx="6368143" cy="3058418"/>
+            <a:ext cx="6368143" cy="3366195"/>
             <a:chOff x="1328057" y="1295400"/>
-            <a:chExt cx="6368143" cy="3058418"/>
+            <a:chExt cx="6368143" cy="3366195"/>
           </a:xfrm>
         </p:grpSpPr>
         <p:sp>
@@ -3270,7 +3275,7 @@
           <p:spPr>
             <a:xfrm>
               <a:off x="4495800" y="3276600"/>
-              <a:ext cx="3200400" cy="1077218"/>
+              <a:ext cx="3200400" cy="1384995"/>
             </a:xfrm>
             <a:prstGeom prst="rect">
               <a:avLst/>
@@ -3286,7 +3291,18 @@
               <a:pPr algn="ctr"/>
               <a:r>
                 <a:rPr lang="en-US" sz="3200" b="1" dirty="0" smtClean="0"/>
-                <a:t>Enables Perfect Forwarding</a:t>
+                <a:t>Enables Perfect </a:t>
+              </a:r>
+              <a:r>
+                <a:rPr lang="en-US" sz="3200" b="1" dirty="0" smtClean="0"/>
+                <a:t>Forwarding</a:t>
+              </a:r>
+              <a:br>
+                <a:rPr lang="en-US" sz="3200" b="1" dirty="0" smtClean="0"/>
+              </a:br>
+              <a:r>
+                <a:rPr lang="en-US" sz="2000" b="1" dirty="0" smtClean="0"/>
+                <a:t>(Not Discussed)</a:t>
               </a:r>
               <a:endParaRPr lang="en-US" sz="3200" b="1" dirty="0"/>
             </a:p>
@@ -4595,15 +4611,7 @@
           <a:p>
             <a:r>
               <a:rPr lang="en-US" sz="4200" b="1" dirty="0" smtClean="0"/>
-              <a:t>C++ </a:t>
-            </a:r>
-            <a:r>
-              <a:rPr lang="en-US" sz="4200" b="1" dirty="0" err="1" smtClean="0"/>
-              <a:t>std</a:t>
-            </a:r>
-            <a:r>
-              <a:rPr lang="en-US" sz="4200" b="1" dirty="0" smtClean="0"/>
-              <a:t>::forward</a:t>
+              <a:t>Why Do We Care About All This?</a:t>
             </a:r>
             <a:endParaRPr lang="en-US" sz="4200" b="1" dirty="0"/>
           </a:p>
@@ -4612,7 +4620,7 @@
     </p:spTree>
     <p:extLst>
       <p:ext uri="{BB962C8B-B14F-4D97-AF65-F5344CB8AC3E}">
-        <p14:creationId xmlns:p14="http://schemas.microsoft.com/office/powerpoint/2010/main" val="570036663"/>
+        <p14:creationId xmlns:p14="http://schemas.microsoft.com/office/powerpoint/2010/main" val="1276712877"/>
       </p:ext>
     </p:extLst>
   </p:cSld>
@@ -4662,106 +4670,162 @@
           <a:lstStyle/>
           <a:p>
             <a:r>
-              <a:rPr lang="en-US" dirty="0" err="1" smtClean="0"/>
-              <a:t>std</a:t>
-            </a:r>
-            <a:r>
               <a:rPr lang="en-US" dirty="0" smtClean="0"/>
-              <a:t>::forward</a:t>
+              <a:t>Better Design</a:t>
             </a:r>
             <a:endParaRPr lang="en-US" dirty="0"/>
           </a:p>
         </p:txBody>
       </p:sp>
-      <p:sp>
-        <p:nvSpPr>
-          <p:cNvPr id="3" name="Content Placeholder 2"/>
-          <p:cNvSpPr>
-            <a:spLocks noGrp="1"/>
-          </p:cNvSpPr>
-          <p:nvPr>
-            <p:ph idx="1"/>
-          </p:nvPr>
-        </p:nvSpPr>
-        <p:spPr/>
-        <p:txBody>
-          <a:bodyPr/>
+      <p:pic>
+        <p:nvPicPr>
+          <p:cNvPr id="4" name="Picture 3"/>
+          <p:cNvPicPr>
+            <a:picLocks noChangeAspect="1"/>
+          </p:cNvPicPr>
+          <p:nvPr/>
+        </p:nvPicPr>
+        <p:blipFill>
+          <a:blip r:embed="rId2"/>
+          <a:stretch>
+            <a:fillRect/>
+          </a:stretch>
+        </p:blipFill>
+        <p:spPr>
+          <a:xfrm>
+            <a:off x="376237" y="1447800"/>
+            <a:ext cx="8467725" cy="4457700"/>
+          </a:xfrm>
+          <a:prstGeom prst="rect">
+            <a:avLst/>
+          </a:prstGeom>
+        </p:spPr>
+      </p:pic>
+      <p:sp>
+        <p:nvSpPr>
+          <p:cNvPr id="3" name="TextBox 2"/>
+          <p:cNvSpPr txBox="1"/>
+          <p:nvPr/>
+        </p:nvSpPr>
+        <p:spPr>
+          <a:xfrm>
+            <a:off x="228600" y="4191000"/>
+            <a:ext cx="3505200" cy="1477328"/>
+          </a:xfrm>
+          <a:prstGeom prst="rect">
+            <a:avLst/>
+          </a:prstGeom>
+          <a:noFill/>
+        </p:spPr>
+        <p:txBody>
+          <a:bodyPr wrap="square" rtlCol="0">
+            <a:spAutoFit/>
+          </a:bodyPr>
           <a:lstStyle/>
           <a:p>
             <a:r>
-              <a:rPr lang="en-US" sz="2400" dirty="0" err="1" smtClean="0"/>
-              <a:t>std</a:t>
-            </a:r>
-            <a:r>
-              <a:rPr lang="en-US" sz="2400" dirty="0" smtClean="0"/>
-              <a:t>::move takes an object and allows you to treat it as a temporary (an rvalue)</a:t>
-            </a:r>
-          </a:p>
-          <a:p>
-            <a:pPr lvl="1"/>
-            <a:r>
-              <a:rPr lang="en-US" sz="2000" dirty="0" smtClean="0"/>
-              <a:t>When you see </a:t>
-            </a:r>
-            <a:r>
-              <a:rPr lang="en-US" sz="2000" dirty="0" err="1" smtClean="0"/>
-              <a:t>std</a:t>
-            </a:r>
-            <a:r>
-              <a:rPr lang="en-US" sz="2000" dirty="0" smtClean="0"/>
-              <a:t>::move, it indicates that the value of the object should not be used afterwards, but you can still assign a new value and continue using it</a:t>
-            </a:r>
-          </a:p>
-          <a:p>
-            <a:endParaRPr lang="en-US" sz="2400" dirty="0"/>
-          </a:p>
-          <a:p>
-            <a:r>
-              <a:rPr lang="en-US" sz="2400" dirty="0" err="1" smtClean="0"/>
-              <a:t>std</a:t>
-            </a:r>
-            <a:r>
-              <a:rPr lang="en-US" sz="2400" dirty="0" smtClean="0"/>
-              <a:t>::forward has a single use case: to cast a template function parameter (inside the function) to the value category (</a:t>
-            </a:r>
-            <a:r>
-              <a:rPr lang="en-US" sz="2400" dirty="0" err="1" smtClean="0"/>
-              <a:t>lvalue</a:t>
-            </a:r>
-            <a:r>
-              <a:rPr lang="en-US" sz="2400" dirty="0" smtClean="0"/>
-              <a:t> or rvalue) the caller used to pass it</a:t>
-            </a:r>
-          </a:p>
-          <a:p>
-            <a:pPr lvl="1"/>
-            <a:r>
-              <a:rPr lang="en-US" sz="2000" dirty="0" smtClean="0"/>
-              <a:t>rvalues are passed as rvalues</a:t>
-            </a:r>
-          </a:p>
-          <a:p>
-            <a:pPr lvl="1"/>
-            <a:r>
-              <a:rPr lang="en-US" sz="2000" dirty="0" smtClean="0"/>
-              <a:t>lvalues are passed as lvalues</a:t>
-            </a:r>
-            <a:endParaRPr lang="en-US" sz="1800" dirty="0" smtClean="0"/>
-          </a:p>
-          <a:p>
-            <a:pPr lvl="1"/>
-            <a:r>
-              <a:rPr lang="en-US" sz="1800" dirty="0" smtClean="0"/>
-              <a:t>I.e., “perfect” forwarding</a:t>
-            </a:r>
-            <a:endParaRPr lang="en-US" sz="2000" dirty="0" smtClean="0"/>
+              <a:rPr lang="en-US" dirty="0" smtClean="0">
+                <a:solidFill>
+                  <a:srgbClr val="FF0000"/>
+                </a:solidFill>
+              </a:rPr>
+              <a:t>We want a vector of </a:t>
+            </a:r>
+            <a:r>
+              <a:rPr lang="en-US" dirty="0" err="1" smtClean="0">
+                <a:solidFill>
+                  <a:srgbClr val="FF0000"/>
+                </a:solidFill>
+              </a:rPr>
+              <a:t>GameObjects</a:t>
+            </a:r>
+            <a:r>
+              <a:rPr lang="en-US" dirty="0" smtClean="0">
+                <a:solidFill>
+                  <a:srgbClr val="FF0000"/>
+                </a:solidFill>
+              </a:rPr>
+              <a:t> that can be “referenced” so that update() and render() can be called </a:t>
+            </a:r>
+            <a:r>
+              <a:rPr lang="en-US" dirty="0" smtClean="0">
+                <a:solidFill>
+                  <a:srgbClr val="FF0000"/>
+                </a:solidFill>
+              </a:rPr>
+              <a:t>-AND-  </a:t>
+            </a:r>
+            <a:r>
+              <a:rPr lang="en-US" dirty="0" smtClean="0">
+                <a:solidFill>
+                  <a:srgbClr val="FF0000"/>
+                </a:solidFill>
+              </a:rPr>
+              <a:t>automatically deleted when program ends</a:t>
+            </a:r>
+            <a:endParaRPr lang="en-US" dirty="0">
+              <a:solidFill>
+                <a:srgbClr val="FF0000"/>
+              </a:solidFill>
+            </a:endParaRPr>
+          </a:p>
+        </p:txBody>
+      </p:sp>
+      <p:sp>
+        <p:nvSpPr>
+          <p:cNvPr id="5" name="Rounded Rectangle 4"/>
+          <p:cNvSpPr/>
+          <p:nvPr/>
+        </p:nvSpPr>
+        <p:spPr>
+          <a:xfrm>
+            <a:off x="3962398" y="2438400"/>
+            <a:ext cx="3810001" cy="1600200"/>
+          </a:xfrm>
+          <a:prstGeom prst="roundRect">
+            <a:avLst/>
+          </a:prstGeom>
+          <a:solidFill>
+            <a:schemeClr val="accent1">
+              <a:alpha val="30000"/>
+            </a:schemeClr>
+          </a:solidFill>
+          <a:ln w="19050">
+            <a:solidFill>
+              <a:srgbClr val="FF0000"/>
+            </a:solidFill>
+            <a:prstDash val="dash"/>
+          </a:ln>
+        </p:spPr>
+        <p:style>
+          <a:lnRef idx="2">
+            <a:schemeClr val="accent1">
+              <a:shade val="50000"/>
+            </a:schemeClr>
+          </a:lnRef>
+          <a:fillRef idx="1">
+            <a:schemeClr val="accent1"/>
+          </a:fillRef>
+          <a:effectRef idx="0">
+            <a:schemeClr val="accent1"/>
+          </a:effectRef>
+          <a:fontRef idx="minor">
+            <a:schemeClr val="lt1"/>
+          </a:fontRef>
+        </p:style>
+        <p:txBody>
+          <a:bodyPr rtlCol="0" anchor="ctr"/>
+          <a:lstStyle/>
+          <a:p>
+            <a:pPr algn="ctr"/>
+            <a:endParaRPr lang="en-US"/>
           </a:p>
         </p:txBody>
       </p:sp>
     </p:spTree>
     <p:extLst>
       <p:ext uri="{BB962C8B-B14F-4D97-AF65-F5344CB8AC3E}">
-        <p14:creationId xmlns:p14="http://schemas.microsoft.com/office/powerpoint/2010/main" val="1043755625"/>
+        <p14:creationId xmlns:p14="http://schemas.microsoft.com/office/powerpoint/2010/main" val="1345343232"/>
       </p:ext>
     </p:extLst>
   </p:cSld>
@@ -4811,81 +4875,98 @@
           <a:lstStyle/>
           <a:p>
             <a:r>
-              <a:rPr lang="en-US" dirty="0" err="1" smtClean="0"/>
+              <a:rPr lang="en-US" dirty="0" smtClean="0"/>
+              <a:t>Basic Idea</a:t>
+            </a:r>
+            <a:endParaRPr lang="en-US" dirty="0"/>
+          </a:p>
+        </p:txBody>
+      </p:sp>
+      <p:sp>
+        <p:nvSpPr>
+          <p:cNvPr id="3" name="Content Placeholder 2"/>
+          <p:cNvSpPr>
+            <a:spLocks noGrp="1"/>
+          </p:cNvSpPr>
+          <p:nvPr>
+            <p:ph idx="1"/>
+          </p:nvPr>
+        </p:nvSpPr>
+        <p:spPr/>
+        <p:txBody>
+          <a:bodyPr/>
+          <a:lstStyle/>
+          <a:p>
+            <a:r>
+              <a:rPr lang="en-US" sz="2800" dirty="0" smtClean="0"/>
+              <a:t>A vector of </a:t>
+            </a:r>
+            <a:r>
+              <a:rPr lang="en-US" sz="2800" dirty="0" err="1" smtClean="0"/>
+              <a:t>GameObjects</a:t>
+            </a:r>
+            <a:endParaRPr lang="en-US" sz="2800" dirty="0" smtClean="0"/>
+          </a:p>
+          <a:p>
+            <a:pPr lvl="1"/>
+            <a:r>
+              <a:rPr lang="en-US" sz="2400" dirty="0" err="1" smtClean="0"/>
               <a:t>std</a:t>
             </a:r>
             <a:r>
-              <a:rPr lang="en-US" dirty="0" smtClean="0"/>
-              <a:t>::forward Illustrated</a:t>
-            </a:r>
-            <a:endParaRPr lang="en-US" dirty="0"/>
-          </a:p>
-        </p:txBody>
-      </p:sp>
-      <p:pic>
-        <p:nvPicPr>
-          <p:cNvPr id="6" name="Picture 5"/>
-          <p:cNvPicPr>
-            <a:picLocks noChangeAspect="1"/>
-          </p:cNvPicPr>
-          <p:nvPr/>
-        </p:nvPicPr>
-        <p:blipFill>
-          <a:blip r:embed="rId2"/>
-          <a:stretch>
-            <a:fillRect/>
-          </a:stretch>
-        </p:blipFill>
-        <p:spPr>
-          <a:xfrm>
-            <a:off x="1033462" y="1295400"/>
-            <a:ext cx="7153275" cy="5334000"/>
-          </a:xfrm>
-          <a:prstGeom prst="rect">
-            <a:avLst/>
-          </a:prstGeom>
-        </p:spPr>
-      </p:pic>
-      <p:pic>
-        <p:nvPicPr>
-          <p:cNvPr id="8" name="Picture 7"/>
-          <p:cNvPicPr>
-            <a:picLocks noChangeAspect="1"/>
-          </p:cNvPicPr>
-          <p:nvPr/>
-        </p:nvPicPr>
-        <p:blipFill>
-          <a:blip r:embed="rId3"/>
-          <a:stretch>
-            <a:fillRect/>
-          </a:stretch>
-        </p:blipFill>
-        <p:spPr>
-          <a:xfrm>
-            <a:off x="6248400" y="4343400"/>
-            <a:ext cx="2676525" cy="1638300"/>
-          </a:xfrm>
-          <a:prstGeom prst="rect">
-            <a:avLst/>
-          </a:prstGeom>
-          <a:ln>
-            <a:solidFill>
-              <a:schemeClr val="accent1"/>
-            </a:solidFill>
-          </a:ln>
-          <a:effectLst>
-            <a:outerShdw blurRad="50800" dist="38100" dir="2700000" algn="tl" rotWithShape="0">
-              <a:prstClr val="black">
-                <a:alpha val="40000"/>
-              </a:prstClr>
-            </a:outerShdw>
-          </a:effectLst>
-        </p:spPr>
-      </p:pic>
+              <a:rPr lang="en-US" sz="2400" dirty="0" smtClean="0"/>
+              <a:t>::vector</a:t>
+            </a:r>
+          </a:p>
+          <a:p>
+            <a:pPr lvl="1"/>
+            <a:r>
+              <a:rPr lang="en-US" sz="2400" dirty="0" smtClean="0"/>
+              <a:t>The vector contains all the </a:t>
+            </a:r>
+            <a:r>
+              <a:rPr lang="en-US" sz="2400" dirty="0" err="1" smtClean="0"/>
+              <a:t>GameObjects</a:t>
+            </a:r>
+            <a:r>
+              <a:rPr lang="en-US" sz="2400" dirty="0" smtClean="0"/>
+              <a:t> within the game</a:t>
+            </a:r>
+          </a:p>
+          <a:p>
+            <a:endParaRPr lang="en-US" sz="2800" dirty="0" smtClean="0"/>
+          </a:p>
+          <a:p>
+            <a:r>
+              <a:rPr lang="en-US" sz="2800" dirty="0" smtClean="0"/>
+              <a:t>A smart pointer to them, so when the smart pointer gets deleted, so does object</a:t>
+            </a:r>
+          </a:p>
+          <a:p>
+            <a:pPr lvl="1"/>
+            <a:r>
+              <a:rPr lang="en-US" sz="2400" dirty="0" err="1" smtClean="0"/>
+              <a:t>std</a:t>
+            </a:r>
+            <a:r>
+              <a:rPr lang="en-US" sz="2400" dirty="0" smtClean="0"/>
+              <a:t>::</a:t>
+            </a:r>
+            <a:r>
+              <a:rPr lang="en-US" sz="2400" dirty="0" err="1" smtClean="0"/>
+              <a:t>unique_ptr</a:t>
+            </a:r>
+            <a:r>
+              <a:rPr lang="en-US" sz="2400" dirty="0" smtClean="0"/>
+              <a:t>&lt;&gt;()</a:t>
+            </a:r>
+          </a:p>
+        </p:txBody>
+      </p:sp>
     </p:spTree>
     <p:extLst>
       <p:ext uri="{BB962C8B-B14F-4D97-AF65-F5344CB8AC3E}">
-        <p14:creationId xmlns:p14="http://schemas.microsoft.com/office/powerpoint/2010/main" val="872766929"/>
+        <p14:creationId xmlns:p14="http://schemas.microsoft.com/office/powerpoint/2010/main" val="427451300"/>
       </p:ext>
     </p:extLst>
   </p:cSld>
@@ -4921,36 +5002,83 @@
       </p:grpSpPr>
       <p:sp>
         <p:nvSpPr>
-          <p:cNvPr id="4" name="Title 3"/>
+          <p:cNvPr id="2" name="Title 1"/>
           <p:cNvSpPr>
             <a:spLocks noGrp="1"/>
           </p:cNvSpPr>
           <p:nvPr>
-            <p:ph type="ctrTitle"/>
+            <p:ph type="title"/>
           </p:nvPr>
         </p:nvSpPr>
-        <p:spPr>
-          <a:xfrm>
-            <a:off x="685800" y="2130425"/>
-            <a:ext cx="7772400" cy="2746375"/>
-          </a:xfrm>
-        </p:spPr>
+        <p:spPr/>
         <p:txBody>
           <a:bodyPr/>
           <a:lstStyle/>
           <a:p>
             <a:r>
-              <a:rPr lang="en-US" sz="4200" b="1" dirty="0" smtClean="0"/>
-              <a:t>Why Do We Care About All This?</a:t>
-            </a:r>
-            <a:endParaRPr lang="en-US" sz="4200" b="1" dirty="0"/>
-          </a:p>
-        </p:txBody>
-      </p:sp>
+              <a:rPr lang="en-US" dirty="0" smtClean="0"/>
+              <a:t>Step #1: Several Objects on Heap</a:t>
+            </a:r>
+            <a:endParaRPr lang="en-US" dirty="0"/>
+          </a:p>
+        </p:txBody>
+      </p:sp>
+      <p:sp>
+        <p:nvSpPr>
+          <p:cNvPr id="5" name="Content Placeholder 4"/>
+          <p:cNvSpPr>
+            <a:spLocks noGrp="1"/>
+          </p:cNvSpPr>
+          <p:nvPr>
+            <p:ph idx="1"/>
+          </p:nvPr>
+        </p:nvSpPr>
+        <p:spPr>
+          <a:xfrm>
+            <a:off x="457200" y="5486400"/>
+            <a:ext cx="8229600" cy="762000"/>
+          </a:xfrm>
+        </p:spPr>
+        <p:txBody>
+          <a:bodyPr/>
+          <a:lstStyle/>
+          <a:p>
+            <a:r>
+              <a:rPr lang="en-US" sz="2000" dirty="0" smtClean="0"/>
+              <a:t>Creates 3 objects that automatically destroyed when main exits</a:t>
+            </a:r>
+            <a:endParaRPr lang="en-US" sz="2000" dirty="0"/>
+          </a:p>
+        </p:txBody>
+      </p:sp>
+      <p:pic>
+        <p:nvPicPr>
+          <p:cNvPr id="4" name="Picture 3"/>
+          <p:cNvPicPr>
+            <a:picLocks noChangeAspect="1"/>
+          </p:cNvPicPr>
+          <p:nvPr/>
+        </p:nvPicPr>
+        <p:blipFill>
+          <a:blip r:embed="rId2"/>
+          <a:stretch>
+            <a:fillRect/>
+          </a:stretch>
+        </p:blipFill>
+        <p:spPr>
+          <a:xfrm>
+            <a:off x="2757487" y="1447800"/>
+            <a:ext cx="3705225" cy="3810000"/>
+          </a:xfrm>
+          <a:prstGeom prst="rect">
+            <a:avLst/>
+          </a:prstGeom>
+        </p:spPr>
+      </p:pic>
     </p:spTree>
     <p:extLst>
       <p:ext uri="{BB962C8B-B14F-4D97-AF65-F5344CB8AC3E}">
-        <p14:creationId xmlns:p14="http://schemas.microsoft.com/office/powerpoint/2010/main" val="1276712877"/>
+        <p14:creationId xmlns:p14="http://schemas.microsoft.com/office/powerpoint/2010/main" val="2225449739"/>
       </p:ext>
     </p:extLst>
   </p:cSld>
@@ -5001,15 +5129,77 @@
           <a:p>
             <a:r>
               <a:rPr lang="en-US" dirty="0" smtClean="0"/>
-              <a:t>Better Design</a:t>
+              <a:t>Step #2: Several Objects in Vector</a:t>
             </a:r>
             <a:endParaRPr lang="en-US" dirty="0"/>
+          </a:p>
+        </p:txBody>
+      </p:sp>
+      <p:sp>
+        <p:nvSpPr>
+          <p:cNvPr id="6" name="Content Placeholder 5"/>
+          <p:cNvSpPr>
+            <a:spLocks noGrp="1"/>
+          </p:cNvSpPr>
+          <p:nvPr>
+            <p:ph idx="1"/>
+          </p:nvPr>
+        </p:nvSpPr>
+        <p:spPr>
+          <a:xfrm>
+            <a:off x="457200" y="5257800"/>
+            <a:ext cx="8229600" cy="990600"/>
+          </a:xfrm>
+        </p:spPr>
+        <p:txBody>
+          <a:bodyPr/>
+          <a:lstStyle/>
+          <a:p>
+            <a:r>
+              <a:rPr lang="en-US" sz="2000" dirty="0" smtClean="0"/>
+              <a:t>Creates 3 objects and add them to vector</a:t>
+            </a:r>
+          </a:p>
+          <a:p>
+            <a:r>
+              <a:rPr lang="en-US" sz="2000" dirty="0" smtClean="0"/>
+              <a:t>When vector is </a:t>
+            </a:r>
+            <a:r>
+              <a:rPr lang="en-US" sz="2000" dirty="0" smtClean="0"/>
+              <a:t>deleted, </a:t>
+            </a:r>
+            <a:r>
+              <a:rPr lang="en-US" sz="2000" dirty="0" smtClean="0"/>
+              <a:t>it automatically </a:t>
+            </a:r>
+            <a:r>
+              <a:rPr lang="en-US" sz="2000" dirty="0" smtClean="0"/>
+              <a:t>deletes </a:t>
+            </a:r>
+            <a:r>
+              <a:rPr lang="en-US" sz="2000" dirty="0" smtClean="0"/>
+              <a:t>all </a:t>
+            </a:r>
+            <a:r>
+              <a:rPr lang="en-US" sz="2000" dirty="0" smtClean="0"/>
+              <a:t>objects (which are </a:t>
+            </a:r>
+            <a:r>
+              <a:rPr lang="en-US" sz="2000" dirty="0" err="1" smtClean="0"/>
+              <a:t>unique_ptr’s</a:t>
+            </a:r>
+            <a:r>
+              <a:rPr lang="en-US" sz="2000" dirty="0" smtClean="0"/>
+              <a:t>); because of that, all the objects being pointed at are deleted</a:t>
+            </a:r>
+            <a:endParaRPr lang="en-US" sz="2000" dirty="0"/>
           </a:p>
         </p:txBody>
       </p:sp>
       <p:pic>
         <p:nvPicPr>
-          <p:cNvPr id="4" name="Picture 3"/>
+          <p:cNvPr id="5" name="Picture 4"/>
           <p:cNvPicPr>
             <a:picLocks noChangeAspect="1"/>
           </p:cNvPicPr>
@@ -5023,123 +5213,18 @@
         </p:blipFill>
         <p:spPr>
           <a:xfrm>
-            <a:off x="376237" y="1447800"/>
-            <a:ext cx="8467725" cy="4457700"/>
+            <a:off x="2552700" y="1447800"/>
+            <a:ext cx="4114800" cy="3619500"/>
           </a:xfrm>
           <a:prstGeom prst="rect">
             <a:avLst/>
           </a:prstGeom>
         </p:spPr>
       </p:pic>
-      <p:sp>
-        <p:nvSpPr>
-          <p:cNvPr id="3" name="TextBox 2"/>
-          <p:cNvSpPr txBox="1"/>
-          <p:nvPr/>
-        </p:nvSpPr>
-        <p:spPr>
-          <a:xfrm>
-            <a:off x="228600" y="4191000"/>
-            <a:ext cx="3505200" cy="1477328"/>
-          </a:xfrm>
-          <a:prstGeom prst="rect">
-            <a:avLst/>
-          </a:prstGeom>
-          <a:noFill/>
-        </p:spPr>
-        <p:txBody>
-          <a:bodyPr wrap="square" rtlCol="0">
-            <a:spAutoFit/>
-          </a:bodyPr>
-          <a:lstStyle/>
-          <a:p>
-            <a:r>
-              <a:rPr lang="en-US" dirty="0" smtClean="0">
-                <a:solidFill>
-                  <a:srgbClr val="FF0000"/>
-                </a:solidFill>
-              </a:rPr>
-              <a:t>We want a vector of </a:t>
-            </a:r>
-            <a:r>
-              <a:rPr lang="en-US" dirty="0" err="1" smtClean="0">
-                <a:solidFill>
-                  <a:srgbClr val="FF0000"/>
-                </a:solidFill>
-              </a:rPr>
-              <a:t>GameObjects</a:t>
-            </a:r>
-            <a:r>
-              <a:rPr lang="en-US" dirty="0" smtClean="0">
-                <a:solidFill>
-                  <a:srgbClr val="FF0000"/>
-                </a:solidFill>
-              </a:rPr>
-              <a:t> that can be “referenced” so that update() and render() can be called –AND- automatically deleted when program ends</a:t>
-            </a:r>
-            <a:endParaRPr lang="en-US" dirty="0">
-              <a:solidFill>
-                <a:srgbClr val="FF0000"/>
-              </a:solidFill>
-            </a:endParaRPr>
-          </a:p>
-        </p:txBody>
-      </p:sp>
-      <p:sp>
-        <p:nvSpPr>
-          <p:cNvPr id="5" name="Rounded Rectangle 4"/>
-          <p:cNvSpPr/>
-          <p:nvPr/>
-        </p:nvSpPr>
-        <p:spPr>
-          <a:xfrm>
-            <a:off x="3962398" y="2438400"/>
-            <a:ext cx="3810001" cy="1600200"/>
-          </a:xfrm>
-          <a:prstGeom prst="roundRect">
-            <a:avLst/>
-          </a:prstGeom>
-          <a:solidFill>
-            <a:schemeClr val="accent1">
-              <a:alpha val="30000"/>
-            </a:schemeClr>
-          </a:solidFill>
-          <a:ln w="19050">
-            <a:solidFill>
-              <a:srgbClr val="FF0000"/>
-            </a:solidFill>
-            <a:prstDash val="dash"/>
-          </a:ln>
-        </p:spPr>
-        <p:style>
-          <a:lnRef idx="2">
-            <a:schemeClr val="accent1">
-              <a:shade val="50000"/>
-            </a:schemeClr>
-          </a:lnRef>
-          <a:fillRef idx="1">
-            <a:schemeClr val="accent1"/>
-          </a:fillRef>
-          <a:effectRef idx="0">
-            <a:schemeClr val="accent1"/>
-          </a:effectRef>
-          <a:fontRef idx="minor">
-            <a:schemeClr val="lt1"/>
-          </a:fontRef>
-        </p:style>
-        <p:txBody>
-          <a:bodyPr rtlCol="0" anchor="ctr"/>
-          <a:lstStyle/>
-          <a:p>
-            <a:pPr algn="ctr"/>
-            <a:endParaRPr lang="en-US"/>
-          </a:p>
-        </p:txBody>
-      </p:sp>
     </p:spTree>
     <p:extLst>
       <p:ext uri="{BB962C8B-B14F-4D97-AF65-F5344CB8AC3E}">
-        <p14:creationId xmlns:p14="http://schemas.microsoft.com/office/powerpoint/2010/main" val="1345343232"/>
+        <p14:creationId xmlns:p14="http://schemas.microsoft.com/office/powerpoint/2010/main" val="431418571"/>
       </p:ext>
     </p:extLst>
   </p:cSld>
@@ -5190,97 +5275,72 @@
           <a:p>
             <a:r>
               <a:rPr lang="en-US" dirty="0" smtClean="0"/>
-              <a:t>Basic Idea</a:t>
+              <a:t>Step #3: Call </a:t>
+            </a:r>
+            <a:r>
+              <a:rPr lang="en-US" dirty="0" err="1" smtClean="0"/>
+              <a:t>Obj</a:t>
+            </a:r>
+            <a:r>
+              <a:rPr lang="en-US" dirty="0" smtClean="0"/>
+              <a:t> Methods</a:t>
             </a:r>
             <a:endParaRPr lang="en-US" dirty="0"/>
           </a:p>
         </p:txBody>
       </p:sp>
-      <p:sp>
-        <p:nvSpPr>
-          <p:cNvPr id="3" name="Content Placeholder 2"/>
-          <p:cNvSpPr>
-            <a:spLocks noGrp="1"/>
-          </p:cNvSpPr>
-          <p:nvPr>
-            <p:ph idx="1"/>
-          </p:nvPr>
-        </p:nvSpPr>
-        <p:spPr/>
-        <p:txBody>
-          <a:bodyPr/>
-          <a:lstStyle/>
-          <a:p>
-            <a:r>
-              <a:rPr lang="en-US" sz="2800" dirty="0" smtClean="0"/>
-              <a:t>A vector of </a:t>
-            </a:r>
-            <a:r>
-              <a:rPr lang="en-US" sz="2800" dirty="0" err="1" smtClean="0"/>
-              <a:t>GameObjects</a:t>
-            </a:r>
-            <a:endParaRPr lang="en-US" sz="2800" dirty="0" smtClean="0"/>
-          </a:p>
-          <a:p>
-            <a:pPr lvl="1"/>
-            <a:r>
-              <a:rPr lang="en-US" sz="2400" dirty="0" err="1" smtClean="0"/>
-              <a:t>std</a:t>
-            </a:r>
-            <a:r>
-              <a:rPr lang="en-US" sz="2400" dirty="0" smtClean="0"/>
-              <a:t>::vector</a:t>
-            </a:r>
-          </a:p>
-          <a:p>
-            <a:pPr lvl="1"/>
-            <a:r>
-              <a:rPr lang="en-US" sz="2400" dirty="0" smtClean="0"/>
-              <a:t>The vector contains all the </a:t>
-            </a:r>
-            <a:r>
-              <a:rPr lang="en-US" sz="2400" dirty="0" err="1" smtClean="0"/>
-              <a:t>GameObjects</a:t>
-            </a:r>
-            <a:r>
-              <a:rPr lang="en-US" sz="2400" dirty="0" smtClean="0"/>
-              <a:t> within the game</a:t>
-            </a:r>
-          </a:p>
-          <a:p>
-            <a:endParaRPr lang="en-US" sz="2800" dirty="0" smtClean="0"/>
-          </a:p>
-          <a:p>
-            <a:r>
-              <a:rPr lang="en-US" sz="2800" dirty="0" smtClean="0"/>
-              <a:t>A smart pointer to them, so when the smart pointer gets deleted, so does object</a:t>
-            </a:r>
-          </a:p>
-          <a:p>
-            <a:pPr lvl="1"/>
-            <a:r>
-              <a:rPr lang="en-US" sz="2400" dirty="0" err="1" smtClean="0"/>
-              <a:t>std</a:t>
-            </a:r>
-            <a:r>
-              <a:rPr lang="en-US" sz="2400" dirty="0" smtClean="0"/>
-              <a:t>::</a:t>
-            </a:r>
-            <a:r>
-              <a:rPr lang="en-US" sz="2400" dirty="0" err="1" smtClean="0"/>
-              <a:t>unique_ptr</a:t>
-            </a:r>
-            <a:r>
-              <a:rPr lang="en-US" sz="2400" dirty="0" smtClean="0"/>
-              <a:t>&lt;&gt;()</a:t>
-            </a:r>
-          </a:p>
-        </p:txBody>
-      </p:sp>
+      <p:pic>
+        <p:nvPicPr>
+          <p:cNvPr id="7" name="Picture 6"/>
+          <p:cNvPicPr>
+            <a:picLocks noChangeAspect="1"/>
+          </p:cNvPicPr>
+          <p:nvPr/>
+        </p:nvPicPr>
+        <p:blipFill>
+          <a:blip r:embed="rId2"/>
+          <a:stretch>
+            <a:fillRect/>
+          </a:stretch>
+        </p:blipFill>
+        <p:spPr>
+          <a:xfrm>
+            <a:off x="533400" y="1295400"/>
+            <a:ext cx="5162550" cy="5114925"/>
+          </a:xfrm>
+          <a:prstGeom prst="rect">
+            <a:avLst/>
+          </a:prstGeom>
+        </p:spPr>
+      </p:pic>
+      <p:pic>
+        <p:nvPicPr>
+          <p:cNvPr id="9" name="Picture 8"/>
+          <p:cNvPicPr>
+            <a:picLocks noChangeAspect="1"/>
+          </p:cNvPicPr>
+          <p:nvPr/>
+        </p:nvPicPr>
+        <p:blipFill>
+          <a:blip r:embed="rId3"/>
+          <a:stretch>
+            <a:fillRect/>
+          </a:stretch>
+        </p:blipFill>
+        <p:spPr>
+          <a:xfrm>
+            <a:off x="6553200" y="2299726"/>
+            <a:ext cx="1600200" cy="3106271"/>
+          </a:xfrm>
+          <a:prstGeom prst="rect">
+            <a:avLst/>
+          </a:prstGeom>
+        </p:spPr>
+      </p:pic>
     </p:spTree>
     <p:extLst>
       <p:ext uri="{BB962C8B-B14F-4D97-AF65-F5344CB8AC3E}">
-        <p14:creationId xmlns:p14="http://schemas.microsoft.com/office/powerpoint/2010/main" val="427451300"/>
+        <p14:creationId xmlns:p14="http://schemas.microsoft.com/office/powerpoint/2010/main" val="3001179437"/>
       </p:ext>
     </p:extLst>
   </p:cSld>
@@ -5331,7 +5391,7 @@
           <a:p>
             <a:r>
               <a:rPr lang="en-US" dirty="0" smtClean="0"/>
-              <a:t>Step #1: Several Objects on Heap</a:t>
+              <a:t>Step #4: Even Better</a:t>
             </a:r>
             <a:endParaRPr lang="en-US" dirty="0"/>
           </a:p>
@@ -5349,8 +5409,8 @@
         </p:nvSpPr>
         <p:spPr>
           <a:xfrm>
-            <a:off x="457200" y="5486400"/>
-            <a:ext cx="8229600" cy="762000"/>
+            <a:off x="5867400" y="1295400"/>
+            <a:ext cx="2819400" cy="4953000"/>
           </a:xfrm>
         </p:spPr>
         <p:txBody>
@@ -5359,7 +5419,49 @@
           <a:p>
             <a:r>
               <a:rPr lang="en-US" sz="2000" dirty="0" smtClean="0"/>
-              <a:t>Creates 3 objects that automatically destroyed when main exits</a:t>
+              <a:t>Q: Why can I remove </a:t>
+            </a:r>
+            <a:r>
+              <a:rPr lang="en-US" sz="2000" dirty="0" err="1" smtClean="0"/>
+              <a:t>std</a:t>
+            </a:r>
+            <a:r>
+              <a:rPr lang="en-US" sz="2000" dirty="0" smtClean="0"/>
+              <a:t>::move?</a:t>
+            </a:r>
+          </a:p>
+          <a:p>
+            <a:pPr lvl="1"/>
+            <a:r>
+              <a:rPr lang="en-US" sz="1600" dirty="0" err="1" smtClean="0"/>
+              <a:t>std</a:t>
+            </a:r>
+            <a:r>
+              <a:rPr lang="en-US" sz="1600" dirty="0" smtClean="0"/>
+              <a:t>::move() is redundant</a:t>
+            </a:r>
+          </a:p>
+          <a:p>
+            <a:pPr lvl="1"/>
+            <a:r>
+              <a:rPr lang="en-US" sz="1600" dirty="0" smtClean="0"/>
+              <a:t>Raw pointers can’t be moved</a:t>
+            </a:r>
+          </a:p>
+          <a:p>
+            <a:endParaRPr lang="en-US" sz="2000" dirty="0"/>
+          </a:p>
+          <a:p>
+            <a:endParaRPr lang="en-US" sz="2000" dirty="0" smtClean="0"/>
+          </a:p>
+          <a:p>
+            <a:r>
+              <a:rPr lang="en-US" sz="2000" dirty="0" err="1" smtClean="0"/>
+              <a:t>make_unique</a:t>
+            </a:r>
+            <a:r>
+              <a:rPr lang="en-US" sz="2000" dirty="0" smtClean="0"/>
+              <a:t>&lt;&gt;() is preferred over using “new”</a:t>
             </a:r>
             <a:endParaRPr lang="en-US" sz="2000" dirty="0"/>
           </a:p>
@@ -5367,7 +5469,7 @@
       </p:sp>
       <p:pic>
         <p:nvPicPr>
-          <p:cNvPr id="4" name="Picture 3"/>
+          <p:cNvPr id="6" name="Picture 5"/>
           <p:cNvPicPr>
             <a:picLocks noChangeAspect="1"/>
           </p:cNvPicPr>
@@ -5381,18 +5483,53 @@
         </p:blipFill>
         <p:spPr>
           <a:xfrm>
-            <a:off x="2757487" y="1447800"/>
-            <a:ext cx="3705225" cy="3810000"/>
+            <a:off x="152400" y="1209675"/>
+            <a:ext cx="5524500" cy="5619750"/>
           </a:xfrm>
           <a:prstGeom prst="rect">
             <a:avLst/>
           </a:prstGeom>
         </p:spPr>
       </p:pic>
+      <p:cxnSp>
+        <p:nvCxnSpPr>
+          <p:cNvPr id="8" name="Straight Connector 7"/>
+          <p:cNvCxnSpPr/>
+          <p:nvPr/>
+        </p:nvCxnSpPr>
+        <p:spPr>
+          <a:xfrm>
+            <a:off x="6477000" y="3505200"/>
+            <a:ext cx="1524000" cy="0"/>
+          </a:xfrm>
+          <a:prstGeom prst="line">
+            <a:avLst/>
+          </a:prstGeom>
+          <a:ln w="12700">
+            <a:prstDash val="dash"/>
+            <a:headEnd type="oval"/>
+            <a:tailEnd type="oval"/>
+          </a:ln>
+        </p:spPr>
+        <p:style>
+          <a:lnRef idx="1">
+            <a:schemeClr val="accent1"/>
+          </a:lnRef>
+          <a:fillRef idx="0">
+            <a:schemeClr val="accent1"/>
+          </a:fillRef>
+          <a:effectRef idx="0">
+            <a:schemeClr val="accent1"/>
+          </a:effectRef>
+          <a:fontRef idx="minor">
+            <a:schemeClr val="tx1"/>
+          </a:fontRef>
+        </p:style>
+      </p:cxnSp>
     </p:spTree>
     <p:extLst>
       <p:ext uri="{BB962C8B-B14F-4D97-AF65-F5344CB8AC3E}">
-        <p14:creationId xmlns:p14="http://schemas.microsoft.com/office/powerpoint/2010/main" val="2225449739"/>
+        <p14:creationId xmlns:p14="http://schemas.microsoft.com/office/powerpoint/2010/main" val="640915666"/>
       </p:ext>
     </p:extLst>
   </p:cSld>
@@ -5428,97 +5565,36 @@
       </p:grpSpPr>
       <p:sp>
         <p:nvSpPr>
-          <p:cNvPr id="2" name="Title 1"/>
+          <p:cNvPr id="4" name="Title 3"/>
           <p:cNvSpPr>
             <a:spLocks noGrp="1"/>
           </p:cNvSpPr>
           <p:nvPr>
-            <p:ph type="title"/>
+            <p:ph type="ctrTitle"/>
           </p:nvPr>
         </p:nvSpPr>
-        <p:spPr/>
+        <p:spPr>
+          <a:xfrm>
+            <a:off x="685800" y="2130425"/>
+            <a:ext cx="7772400" cy="2746375"/>
+          </a:xfrm>
+        </p:spPr>
         <p:txBody>
           <a:bodyPr/>
           <a:lstStyle/>
           <a:p>
             <a:r>
-              <a:rPr lang="en-US" dirty="0" smtClean="0"/>
-              <a:t>Step #2: Several Objects in Vector</a:t>
-            </a:r>
-            <a:endParaRPr lang="en-US" dirty="0"/>
-          </a:p>
-        </p:txBody>
-      </p:sp>
-      <p:sp>
-        <p:nvSpPr>
-          <p:cNvPr id="6" name="Content Placeholder 5"/>
-          <p:cNvSpPr>
-            <a:spLocks noGrp="1"/>
-          </p:cNvSpPr>
-          <p:nvPr>
-            <p:ph idx="1"/>
-          </p:nvPr>
-        </p:nvSpPr>
-        <p:spPr>
-          <a:xfrm>
-            <a:off x="457200" y="5257800"/>
-            <a:ext cx="8229600" cy="990600"/>
-          </a:xfrm>
-        </p:spPr>
-        <p:txBody>
-          <a:bodyPr/>
-          <a:lstStyle/>
-          <a:p>
-            <a:r>
-              <a:rPr lang="en-US" sz="2000" dirty="0" smtClean="0"/>
-              <a:t>Creates 3 objects and add them to vector</a:t>
-            </a:r>
-          </a:p>
-          <a:p>
-            <a:r>
-              <a:rPr lang="en-US" sz="2000" dirty="0" smtClean="0"/>
-              <a:t>When vector is destroyed, it automatically delete all objects (which as </a:t>
-            </a:r>
-            <a:r>
-              <a:rPr lang="en-US" sz="2000" dirty="0" err="1" smtClean="0"/>
-              <a:t>unique_ptr’s</a:t>
-            </a:r>
-            <a:r>
-              <a:rPr lang="en-US" sz="2000" dirty="0" smtClean="0"/>
-              <a:t>) which then delete what they are pointing at</a:t>
-            </a:r>
-            <a:endParaRPr lang="en-US" sz="2000" dirty="0"/>
-          </a:p>
-        </p:txBody>
-      </p:sp>
-      <p:pic>
-        <p:nvPicPr>
-          <p:cNvPr id="5" name="Picture 4"/>
-          <p:cNvPicPr>
-            <a:picLocks noChangeAspect="1"/>
-          </p:cNvPicPr>
-          <p:nvPr/>
-        </p:nvPicPr>
-        <p:blipFill>
-          <a:blip r:embed="rId2"/>
-          <a:stretch>
-            <a:fillRect/>
-          </a:stretch>
-        </p:blipFill>
-        <p:spPr>
-          <a:xfrm>
-            <a:off x="2552700" y="1447800"/>
-            <a:ext cx="4114800" cy="3619500"/>
-          </a:xfrm>
-          <a:prstGeom prst="rect">
-            <a:avLst/>
-          </a:prstGeom>
-        </p:spPr>
-      </p:pic>
+              <a:rPr lang="en-US" sz="3600" b="1" dirty="0" smtClean="0"/>
+              <a:t>EOF</a:t>
+            </a:r>
+            <a:endParaRPr lang="en-US" sz="3600" b="1" dirty="0"/>
+          </a:p>
+        </p:txBody>
+      </p:sp>
     </p:spTree>
     <p:extLst>
       <p:ext uri="{BB962C8B-B14F-4D97-AF65-F5344CB8AC3E}">
-        <p14:creationId xmlns:p14="http://schemas.microsoft.com/office/powerpoint/2010/main" val="431418571"/>
+        <p14:creationId xmlns:p14="http://schemas.microsoft.com/office/powerpoint/2010/main" val="202416060"/>
       </p:ext>
     </p:extLst>
   </p:cSld>
@@ -5743,91 +5819,44 @@
       </p:grpSpPr>
       <p:sp>
         <p:nvSpPr>
-          <p:cNvPr id="2" name="Title 1"/>
+          <p:cNvPr id="4" name="Title 3"/>
           <p:cNvSpPr>
             <a:spLocks noGrp="1"/>
           </p:cNvSpPr>
           <p:nvPr>
-            <p:ph type="title"/>
+            <p:ph type="ctrTitle"/>
           </p:nvPr>
         </p:nvSpPr>
-        <p:spPr/>
+        <p:spPr>
+          <a:xfrm>
+            <a:off x="685800" y="2130425"/>
+            <a:ext cx="7772400" cy="2746375"/>
+          </a:xfrm>
+        </p:spPr>
         <p:txBody>
           <a:bodyPr/>
           <a:lstStyle/>
           <a:p>
             <a:r>
-              <a:rPr lang="en-US" dirty="0" smtClean="0"/>
-              <a:t>Step #</a:t>
-            </a:r>
-            <a:r>
-              <a:rPr lang="en-US" dirty="0" smtClean="0"/>
-              <a:t>3: Call </a:t>
-            </a:r>
-            <a:r>
-              <a:rPr lang="en-US" dirty="0" err="1" smtClean="0"/>
-              <a:t>Obj</a:t>
-            </a:r>
-            <a:r>
-              <a:rPr lang="en-US" dirty="0" smtClean="0"/>
-              <a:t> Methods</a:t>
-            </a:r>
-            <a:endParaRPr lang="en-US" dirty="0"/>
-          </a:p>
-        </p:txBody>
-      </p:sp>
-      <p:pic>
-        <p:nvPicPr>
-          <p:cNvPr id="7" name="Picture 6"/>
-          <p:cNvPicPr>
-            <a:picLocks noChangeAspect="1"/>
-          </p:cNvPicPr>
-          <p:nvPr/>
-        </p:nvPicPr>
-        <p:blipFill>
-          <a:blip r:embed="rId2"/>
-          <a:stretch>
-            <a:fillRect/>
-          </a:stretch>
-        </p:blipFill>
-        <p:spPr>
-          <a:xfrm>
-            <a:off x="533400" y="1295400"/>
-            <a:ext cx="5162550" cy="5114925"/>
-          </a:xfrm>
-          <a:prstGeom prst="rect">
-            <a:avLst/>
-          </a:prstGeom>
-        </p:spPr>
-      </p:pic>
-      <p:pic>
-        <p:nvPicPr>
-          <p:cNvPr id="9" name="Picture 8"/>
-          <p:cNvPicPr>
-            <a:picLocks noChangeAspect="1"/>
-          </p:cNvPicPr>
-          <p:nvPr/>
-        </p:nvPicPr>
-        <p:blipFill>
-          <a:blip r:embed="rId3"/>
-          <a:stretch>
-            <a:fillRect/>
-          </a:stretch>
-        </p:blipFill>
-        <p:spPr>
-          <a:xfrm>
-            <a:off x="6553200" y="2299726"/>
-            <a:ext cx="1600200" cy="3106271"/>
-          </a:xfrm>
-          <a:prstGeom prst="rect">
-            <a:avLst/>
-          </a:prstGeom>
-        </p:spPr>
-      </p:pic>
+              <a:rPr lang="en-US" sz="4200" b="1" dirty="0" smtClean="0"/>
+              <a:t>C++ </a:t>
+            </a:r>
+            <a:r>
+              <a:rPr lang="en-US" sz="4200" b="1" dirty="0" err="1" smtClean="0"/>
+              <a:t>std</a:t>
+            </a:r>
+            <a:r>
+              <a:rPr lang="en-US" sz="4200" b="1" dirty="0" smtClean="0"/>
+              <a:t>::forward</a:t>
+            </a:r>
+            <a:endParaRPr lang="en-US" sz="4200" b="1" dirty="0"/>
+          </a:p>
+        </p:txBody>
+      </p:sp>
     </p:spTree>
     <p:extLst>
       <p:ext uri="{BB962C8B-B14F-4D97-AF65-F5344CB8AC3E}">
-        <p14:creationId xmlns:p14="http://schemas.microsoft.com/office/powerpoint/2010/main" val="3001179437"/>
+        <p14:creationId xmlns:p14="http://schemas.microsoft.com/office/powerpoint/2010/main" val="570036663"/>
       </p:ext>
     </p:extLst>
   </p:cSld>
@@ -5863,36 +5892,244 @@
       </p:grpSpPr>
       <p:sp>
         <p:nvSpPr>
-          <p:cNvPr id="4" name="Title 3"/>
+          <p:cNvPr id="2" name="Title 1"/>
           <p:cNvSpPr>
             <a:spLocks noGrp="1"/>
           </p:cNvSpPr>
           <p:nvPr>
-            <p:ph type="ctrTitle"/>
+            <p:ph type="title"/>
           </p:nvPr>
         </p:nvSpPr>
-        <p:spPr>
-          <a:xfrm>
-            <a:off x="685800" y="2130425"/>
-            <a:ext cx="7772400" cy="2746375"/>
-          </a:xfrm>
-        </p:spPr>
+        <p:spPr/>
         <p:txBody>
           <a:bodyPr/>
           <a:lstStyle/>
           <a:p>
             <a:r>
-              <a:rPr lang="en-US" sz="3600" b="1" dirty="0" smtClean="0"/>
-              <a:t>EOF</a:t>
-            </a:r>
-            <a:endParaRPr lang="en-US" sz="3600" b="1" dirty="0"/>
+              <a:rPr lang="en-US" dirty="0" err="1" smtClean="0"/>
+              <a:t>std</a:t>
+            </a:r>
+            <a:r>
+              <a:rPr lang="en-US" dirty="0" smtClean="0"/>
+              <a:t>::forward</a:t>
+            </a:r>
+            <a:endParaRPr lang="en-US" dirty="0"/>
+          </a:p>
+        </p:txBody>
+      </p:sp>
+      <p:sp>
+        <p:nvSpPr>
+          <p:cNvPr id="3" name="Content Placeholder 2"/>
+          <p:cNvSpPr>
+            <a:spLocks noGrp="1"/>
+          </p:cNvSpPr>
+          <p:nvPr>
+            <p:ph idx="1"/>
+          </p:nvPr>
+        </p:nvSpPr>
+        <p:spPr/>
+        <p:txBody>
+          <a:bodyPr/>
+          <a:lstStyle/>
+          <a:p>
+            <a:r>
+              <a:rPr lang="en-US" sz="2400" dirty="0" err="1" smtClean="0"/>
+              <a:t>std</a:t>
+            </a:r>
+            <a:r>
+              <a:rPr lang="en-US" sz="2400" dirty="0" smtClean="0"/>
+              <a:t>::move takes an object and allows you to treat it as a temporary (an rvalue)</a:t>
+            </a:r>
+          </a:p>
+          <a:p>
+            <a:pPr lvl="1"/>
+            <a:r>
+              <a:rPr lang="en-US" sz="2000" dirty="0" smtClean="0"/>
+              <a:t>When you see </a:t>
+            </a:r>
+            <a:r>
+              <a:rPr lang="en-US" sz="2000" dirty="0" err="1" smtClean="0"/>
+              <a:t>std</a:t>
+            </a:r>
+            <a:r>
+              <a:rPr lang="en-US" sz="2000" dirty="0" smtClean="0"/>
+              <a:t>::move, it indicates that the value of the object should not be used afterwards, but you can still assign a new value and continue using it</a:t>
+            </a:r>
+          </a:p>
+          <a:p>
+            <a:endParaRPr lang="en-US" sz="2400" dirty="0"/>
+          </a:p>
+          <a:p>
+            <a:r>
+              <a:rPr lang="en-US" sz="2400" dirty="0" err="1" smtClean="0"/>
+              <a:t>std</a:t>
+            </a:r>
+            <a:r>
+              <a:rPr lang="en-US" sz="2400" dirty="0" smtClean="0"/>
+              <a:t>::forward has a single use case: to cast a template function parameter (inside the function) to the value category (</a:t>
+            </a:r>
+            <a:r>
+              <a:rPr lang="en-US" sz="2400" dirty="0" err="1" smtClean="0"/>
+              <a:t>lvalue</a:t>
+            </a:r>
+            <a:r>
+              <a:rPr lang="en-US" sz="2400" dirty="0" smtClean="0"/>
+              <a:t> or rvalue) the caller used to pass it</a:t>
+            </a:r>
+          </a:p>
+          <a:p>
+            <a:pPr lvl="1"/>
+            <a:r>
+              <a:rPr lang="en-US" sz="2000" dirty="0" smtClean="0"/>
+              <a:t>rvalues are passed as rvalues</a:t>
+            </a:r>
+          </a:p>
+          <a:p>
+            <a:pPr lvl="1"/>
+            <a:r>
+              <a:rPr lang="en-US" sz="2000" dirty="0" smtClean="0"/>
+              <a:t>lvalues are passed as lvalues</a:t>
+            </a:r>
+            <a:endParaRPr lang="en-US" sz="1800" dirty="0" smtClean="0"/>
+          </a:p>
+          <a:p>
+            <a:pPr lvl="1"/>
+            <a:r>
+              <a:rPr lang="en-US" sz="1800" dirty="0" smtClean="0"/>
+              <a:t>I.e., “perfect” forwarding</a:t>
+            </a:r>
+            <a:endParaRPr lang="en-US" sz="2000" dirty="0" smtClean="0"/>
           </a:p>
         </p:txBody>
       </p:sp>
     </p:spTree>
     <p:extLst>
       <p:ext uri="{BB962C8B-B14F-4D97-AF65-F5344CB8AC3E}">
-        <p14:creationId xmlns:p14="http://schemas.microsoft.com/office/powerpoint/2010/main" val="202416060"/>
+        <p14:creationId xmlns:p14="http://schemas.microsoft.com/office/powerpoint/2010/main" val="1043755625"/>
+      </p:ext>
+    </p:extLst>
+  </p:cSld>
+  <p:clrMapOvr>
+    <a:masterClrMapping/>
+  </p:clrMapOvr>
+  <p:timing>
+    <p:tnLst>
+      <p:par>
+        <p:cTn id="1" dur="indefinite" restart="never" nodeType="tmRoot"/>
+      </p:par>
+    </p:tnLst>
+  </p:timing>
+</p:sld>
+</file>
+
+<file path=ppt/slides/slide32.xml><?xml version="1.0" encoding="utf-8"?>
+<p:sld xmlns:a="http://schemas.openxmlformats.org/drawingml/2006/main" xmlns:r="http://schemas.openxmlformats.org/officeDocument/2006/relationships" xmlns:p="http://schemas.openxmlformats.org/presentationml/2006/main">
+  <p:cSld>
+    <p:spTree>
+      <p:nvGrpSpPr>
+        <p:cNvPr id="1" name=""/>
+        <p:cNvGrpSpPr/>
+        <p:nvPr/>
+      </p:nvGrpSpPr>
+      <p:grpSpPr>
+        <a:xfrm>
+          <a:off x="0" y="0"/>
+          <a:ext cx="0" cy="0"/>
+          <a:chOff x="0" y="0"/>
+          <a:chExt cx="0" cy="0"/>
+        </a:xfrm>
+      </p:grpSpPr>
+      <p:sp>
+        <p:nvSpPr>
+          <p:cNvPr id="2" name="Title 1"/>
+          <p:cNvSpPr>
+            <a:spLocks noGrp="1"/>
+          </p:cNvSpPr>
+          <p:nvPr>
+            <p:ph type="title"/>
+          </p:nvPr>
+        </p:nvSpPr>
+        <p:spPr/>
+        <p:txBody>
+          <a:bodyPr/>
+          <a:lstStyle/>
+          <a:p>
+            <a:r>
+              <a:rPr lang="en-US" dirty="0" err="1" smtClean="0"/>
+              <a:t>std</a:t>
+            </a:r>
+            <a:r>
+              <a:rPr lang="en-US" dirty="0" smtClean="0"/>
+              <a:t>::forward Illustrated</a:t>
+            </a:r>
+            <a:endParaRPr lang="en-US" dirty="0"/>
+          </a:p>
+        </p:txBody>
+      </p:sp>
+      <p:pic>
+        <p:nvPicPr>
+          <p:cNvPr id="6" name="Picture 5"/>
+          <p:cNvPicPr>
+            <a:picLocks noChangeAspect="1"/>
+          </p:cNvPicPr>
+          <p:nvPr/>
+        </p:nvPicPr>
+        <p:blipFill>
+          <a:blip r:embed="rId2"/>
+          <a:stretch>
+            <a:fillRect/>
+          </a:stretch>
+        </p:blipFill>
+        <p:spPr>
+          <a:xfrm>
+            <a:off x="1033462" y="1295400"/>
+            <a:ext cx="7153275" cy="5334000"/>
+          </a:xfrm>
+          <a:prstGeom prst="rect">
+            <a:avLst/>
+          </a:prstGeom>
+        </p:spPr>
+      </p:pic>
+      <p:pic>
+        <p:nvPicPr>
+          <p:cNvPr id="8" name="Picture 7"/>
+          <p:cNvPicPr>
+            <a:picLocks noChangeAspect="1"/>
+          </p:cNvPicPr>
+          <p:nvPr/>
+        </p:nvPicPr>
+        <p:blipFill>
+          <a:blip r:embed="rId3"/>
+          <a:stretch>
+            <a:fillRect/>
+          </a:stretch>
+        </p:blipFill>
+        <p:spPr>
+          <a:xfrm>
+            <a:off x="6248400" y="4343400"/>
+            <a:ext cx="2676525" cy="1638300"/>
+          </a:xfrm>
+          <a:prstGeom prst="rect">
+            <a:avLst/>
+          </a:prstGeom>
+          <a:ln>
+            <a:solidFill>
+              <a:schemeClr val="accent1"/>
+            </a:solidFill>
+          </a:ln>
+          <a:effectLst>
+            <a:outerShdw blurRad="50800" dist="38100" dir="2700000" algn="tl" rotWithShape="0">
+              <a:prstClr val="black">
+                <a:alpha val="40000"/>
+              </a:prstClr>
+            </a:outerShdw>
+          </a:effectLst>
+        </p:spPr>
+      </p:pic>
+    </p:spTree>
+    <p:extLst>
+      <p:ext uri="{BB962C8B-B14F-4D97-AF65-F5344CB8AC3E}">
+        <p14:creationId xmlns:p14="http://schemas.microsoft.com/office/powerpoint/2010/main" val="872766929"/>
       </p:ext>
     </p:extLst>
   </p:cSld>

</xml_diff>